<commit_message>
changes from meeting less video reshoot.
</commit_message>
<xml_diff>
--- a/apps/study/www/video_slides.pptx
+++ b/apps/study/www/video_slides.pptx
@@ -5,13 +5,18 @@
     <p:sldMasterId id="2147483648" r:id="rId1"/>
   </p:sldMasterIdLst>
   <p:notesMasterIdLst>
-    <p:notesMasterId r:id="rId6"/>
+    <p:notesMasterId r:id="rId11"/>
   </p:notesMasterIdLst>
   <p:sldIdLst>
-    <p:sldId id="260" r:id="rId2"/>
-    <p:sldId id="257" r:id="rId3"/>
-    <p:sldId id="258" r:id="rId4"/>
-    <p:sldId id="259" r:id="rId5"/>
+    <p:sldId id="265" r:id="rId2"/>
+    <p:sldId id="261" r:id="rId3"/>
+    <p:sldId id="262" r:id="rId4"/>
+    <p:sldId id="263" r:id="rId5"/>
+    <p:sldId id="264" r:id="rId6"/>
+    <p:sldId id="260" r:id="rId7"/>
+    <p:sldId id="257" r:id="rId8"/>
+    <p:sldId id="258" r:id="rId9"/>
+    <p:sldId id="259" r:id="rId10"/>
   </p:sldIdLst>
   <p:sldSz cx="12192000" cy="6858000"/>
   <p:notesSz cx="6858000" cy="9144000"/>
@@ -200,7 +205,7 @@
           <a:p>
             <a:fld id="{216C9E1D-008B-4F77-A307-EDC870D5B4E7}" type="datetimeFigureOut">
               <a:rPr lang="en-AU" smtClean="0"/>
-              <a:t>15/01/2020</a:t>
+              <a:t>17/01/2020</a:t>
             </a:fld>
             <a:endParaRPr lang="en-AU"/>
           </a:p>
@@ -565,7 +570,7 @@
           <a:p>
             <a:fld id="{3DF2C5BF-46B2-4D7B-A949-6BFF11D34A9A}" type="slidenum">
               <a:rPr lang="en-AU" smtClean="0"/>
-              <a:t>1</a:t>
+              <a:t>2</a:t>
             </a:fld>
             <a:endParaRPr lang="en-AU"/>
           </a:p>
@@ -574,7 +579,7 @@
     </p:spTree>
     <p:extLst>
       <p:ext uri="{BB962C8B-B14F-4D97-AF65-F5344CB8AC3E}">
-        <p14:creationId xmlns:p14="http://schemas.microsoft.com/office/powerpoint/2010/main" val="366844273"/>
+        <p14:creationId xmlns:p14="http://schemas.microsoft.com/office/powerpoint/2010/main" val="3482998114"/>
       </p:ext>
     </p:extLst>
   </p:cSld>
@@ -649,7 +654,7 @@
           <a:p>
             <a:fld id="{3DF2C5BF-46B2-4D7B-A949-6BFF11D34A9A}" type="slidenum">
               <a:rPr lang="en-AU" smtClean="0"/>
-              <a:t>2</a:t>
+              <a:t>3</a:t>
             </a:fld>
             <a:endParaRPr lang="en-AU"/>
           </a:p>
@@ -658,7 +663,7 @@
     </p:spTree>
     <p:extLst>
       <p:ext uri="{BB962C8B-B14F-4D97-AF65-F5344CB8AC3E}">
-        <p14:creationId xmlns:p14="http://schemas.microsoft.com/office/powerpoint/2010/main" val="2076558489"/>
+        <p14:creationId xmlns:p14="http://schemas.microsoft.com/office/powerpoint/2010/main" val="2954309474"/>
       </p:ext>
     </p:extLst>
   </p:cSld>
@@ -733,7 +738,291 @@
           <a:p>
             <a:fld id="{3DF2C5BF-46B2-4D7B-A949-6BFF11D34A9A}" type="slidenum">
               <a:rPr lang="en-AU" smtClean="0"/>
-              <a:t>4</a:t>
+              <a:t>5</a:t>
+            </a:fld>
+            <a:endParaRPr lang="en-AU"/>
+          </a:p>
+        </p:txBody>
+      </p:sp>
+    </p:spTree>
+    <p:extLst>
+      <p:ext uri="{BB962C8B-B14F-4D97-AF65-F5344CB8AC3E}">
+        <p14:creationId xmlns:p14="http://schemas.microsoft.com/office/powerpoint/2010/main" val="1635382660"/>
+      </p:ext>
+    </p:extLst>
+  </p:cSld>
+  <p:clrMapOvr>
+    <a:masterClrMapping/>
+  </p:clrMapOvr>
+</p:notes>
+</file>
+
+<file path=ppt/notesSlides/notesSlide4.xml><?xml version="1.0" encoding="utf-8"?>
+<p:notes xmlns:a="http://schemas.openxmlformats.org/drawingml/2006/main" xmlns:r="http://schemas.openxmlformats.org/officeDocument/2006/relationships" xmlns:p="http://schemas.openxmlformats.org/presentationml/2006/main">
+  <p:cSld>
+    <p:spTree>
+      <p:nvGrpSpPr>
+        <p:cNvPr id="1" name=""/>
+        <p:cNvGrpSpPr/>
+        <p:nvPr/>
+      </p:nvGrpSpPr>
+      <p:grpSpPr>
+        <a:xfrm>
+          <a:off x="0" y="0"/>
+          <a:ext cx="0" cy="0"/>
+          <a:chOff x="0" y="0"/>
+          <a:chExt cx="0" cy="0"/>
+        </a:xfrm>
+      </p:grpSpPr>
+      <p:sp>
+        <p:nvSpPr>
+          <p:cNvPr id="2" name="Slide Image Placeholder 1"/>
+          <p:cNvSpPr>
+            <a:spLocks noGrp="1" noRot="1" noChangeAspect="1"/>
+          </p:cNvSpPr>
+          <p:nvPr>
+            <p:ph type="sldImg"/>
+          </p:nvPr>
+        </p:nvSpPr>
+        <p:spPr/>
+      </p:sp>
+      <p:sp>
+        <p:nvSpPr>
+          <p:cNvPr id="3" name="Notes Placeholder 2"/>
+          <p:cNvSpPr>
+            <a:spLocks noGrp="1"/>
+          </p:cNvSpPr>
+          <p:nvPr>
+            <p:ph type="body" idx="1"/>
+          </p:nvPr>
+        </p:nvSpPr>
+        <p:spPr/>
+        <p:txBody>
+          <a:bodyPr/>
+          <a:lstStyle/>
+          <a:p>
+            <a:r>
+              <a:rPr lang="en-AU" dirty="0"/>
+              <a:t>-Data: shown as scatterplot.</a:t>
+            </a:r>
+          </a:p>
+          <a:p>
+            <a:r>
+              <a:rPr lang="en-AU" dirty="0"/>
+              <a:t>-All data contains clusters/ groups which is sometime shown in </a:t>
+            </a:r>
+            <a:r>
+              <a:rPr lang="en-AU" dirty="0" err="1"/>
+              <a:t>color</a:t>
+            </a:r>
+            <a:r>
+              <a:rPr lang="en-AU" dirty="0"/>
+              <a:t> and shape.</a:t>
+            </a:r>
+          </a:p>
+          <a:p>
+            <a:r>
+              <a:rPr lang="en-AU" dirty="0"/>
+              <a:t>-variable map depicts the magnitude and direction each variable contributes.</a:t>
+            </a:r>
+          </a:p>
+          <a:p>
+            <a:r>
+              <a:rPr lang="en-AU" dirty="0"/>
+              <a:t>-3 different visual factors </a:t>
+            </a:r>
+          </a:p>
+          <a:p>
+            <a:endParaRPr lang="en-AU" dirty="0"/>
+          </a:p>
+        </p:txBody>
+      </p:sp>
+      <p:sp>
+        <p:nvSpPr>
+          <p:cNvPr id="4" name="Slide Number Placeholder 3"/>
+          <p:cNvSpPr>
+            <a:spLocks noGrp="1"/>
+          </p:cNvSpPr>
+          <p:nvPr>
+            <p:ph type="sldNum" sz="quarter" idx="5"/>
+          </p:nvPr>
+        </p:nvSpPr>
+        <p:spPr/>
+        <p:txBody>
+          <a:bodyPr/>
+          <a:lstStyle/>
+          <a:p>
+            <a:fld id="{3DF2C5BF-46B2-4D7B-A949-6BFF11D34A9A}" type="slidenum">
+              <a:rPr lang="en-AU" smtClean="0"/>
+              <a:t>6</a:t>
+            </a:fld>
+            <a:endParaRPr lang="en-AU"/>
+          </a:p>
+        </p:txBody>
+      </p:sp>
+    </p:spTree>
+    <p:extLst>
+      <p:ext uri="{BB962C8B-B14F-4D97-AF65-F5344CB8AC3E}">
+        <p14:creationId xmlns:p14="http://schemas.microsoft.com/office/powerpoint/2010/main" val="366844273"/>
+      </p:ext>
+    </p:extLst>
+  </p:cSld>
+  <p:clrMapOvr>
+    <a:masterClrMapping/>
+  </p:clrMapOvr>
+</p:notes>
+</file>
+
+<file path=ppt/notesSlides/notesSlide5.xml><?xml version="1.0" encoding="utf-8"?>
+<p:notes xmlns:a="http://schemas.openxmlformats.org/drawingml/2006/main" xmlns:r="http://schemas.openxmlformats.org/officeDocument/2006/relationships" xmlns:p="http://schemas.openxmlformats.org/presentationml/2006/main">
+  <p:cSld>
+    <p:spTree>
+      <p:nvGrpSpPr>
+        <p:cNvPr id="1" name=""/>
+        <p:cNvGrpSpPr/>
+        <p:nvPr/>
+      </p:nvGrpSpPr>
+      <p:grpSpPr>
+        <a:xfrm>
+          <a:off x="0" y="0"/>
+          <a:ext cx="0" cy="0"/>
+          <a:chOff x="0" y="0"/>
+          <a:chExt cx="0" cy="0"/>
+        </a:xfrm>
+      </p:grpSpPr>
+      <p:sp>
+        <p:nvSpPr>
+          <p:cNvPr id="2" name="Slide Image Placeholder 1"/>
+          <p:cNvSpPr>
+            <a:spLocks noGrp="1" noRot="1" noChangeAspect="1"/>
+          </p:cNvSpPr>
+          <p:nvPr>
+            <p:ph type="sldImg"/>
+          </p:nvPr>
+        </p:nvSpPr>
+        <p:spPr/>
+      </p:sp>
+      <p:sp>
+        <p:nvSpPr>
+          <p:cNvPr id="3" name="Notes Placeholder 2"/>
+          <p:cNvSpPr>
+            <a:spLocks noGrp="1"/>
+          </p:cNvSpPr>
+          <p:nvPr>
+            <p:ph type="body" idx="1"/>
+          </p:nvPr>
+        </p:nvSpPr>
+        <p:spPr/>
+        <p:txBody>
+          <a:bodyPr/>
+          <a:lstStyle/>
+          <a:p>
+            <a:endParaRPr lang="en-AU" dirty="0"/>
+          </a:p>
+        </p:txBody>
+      </p:sp>
+      <p:sp>
+        <p:nvSpPr>
+          <p:cNvPr id="4" name="Slide Number Placeholder 3"/>
+          <p:cNvSpPr>
+            <a:spLocks noGrp="1"/>
+          </p:cNvSpPr>
+          <p:nvPr>
+            <p:ph type="sldNum" sz="quarter" idx="5"/>
+          </p:nvPr>
+        </p:nvSpPr>
+        <p:spPr/>
+        <p:txBody>
+          <a:bodyPr/>
+          <a:lstStyle/>
+          <a:p>
+            <a:fld id="{3DF2C5BF-46B2-4D7B-A949-6BFF11D34A9A}" type="slidenum">
+              <a:rPr lang="en-AU" smtClean="0"/>
+              <a:t>7</a:t>
+            </a:fld>
+            <a:endParaRPr lang="en-AU"/>
+          </a:p>
+        </p:txBody>
+      </p:sp>
+    </p:spTree>
+    <p:extLst>
+      <p:ext uri="{BB962C8B-B14F-4D97-AF65-F5344CB8AC3E}">
+        <p14:creationId xmlns:p14="http://schemas.microsoft.com/office/powerpoint/2010/main" val="2076558489"/>
+      </p:ext>
+    </p:extLst>
+  </p:cSld>
+  <p:clrMapOvr>
+    <a:masterClrMapping/>
+  </p:clrMapOvr>
+</p:notes>
+</file>
+
+<file path=ppt/notesSlides/notesSlide6.xml><?xml version="1.0" encoding="utf-8"?>
+<p:notes xmlns:a="http://schemas.openxmlformats.org/drawingml/2006/main" xmlns:r="http://schemas.openxmlformats.org/officeDocument/2006/relationships" xmlns:p="http://schemas.openxmlformats.org/presentationml/2006/main">
+  <p:cSld>
+    <p:spTree>
+      <p:nvGrpSpPr>
+        <p:cNvPr id="1" name=""/>
+        <p:cNvGrpSpPr/>
+        <p:nvPr/>
+      </p:nvGrpSpPr>
+      <p:grpSpPr>
+        <a:xfrm>
+          <a:off x="0" y="0"/>
+          <a:ext cx="0" cy="0"/>
+          <a:chOff x="0" y="0"/>
+          <a:chExt cx="0" cy="0"/>
+        </a:xfrm>
+      </p:grpSpPr>
+      <p:sp>
+        <p:nvSpPr>
+          <p:cNvPr id="2" name="Slide Image Placeholder 1"/>
+          <p:cNvSpPr>
+            <a:spLocks noGrp="1" noRot="1" noChangeAspect="1"/>
+          </p:cNvSpPr>
+          <p:nvPr>
+            <p:ph type="sldImg"/>
+          </p:nvPr>
+        </p:nvSpPr>
+        <p:spPr/>
+      </p:sp>
+      <p:sp>
+        <p:nvSpPr>
+          <p:cNvPr id="3" name="Notes Placeholder 2"/>
+          <p:cNvSpPr>
+            <a:spLocks noGrp="1"/>
+          </p:cNvSpPr>
+          <p:nvPr>
+            <p:ph type="body" idx="1"/>
+          </p:nvPr>
+        </p:nvSpPr>
+        <p:spPr/>
+        <p:txBody>
+          <a:bodyPr/>
+          <a:lstStyle/>
+          <a:p>
+            <a:endParaRPr lang="en-AU" dirty="0"/>
+          </a:p>
+        </p:txBody>
+      </p:sp>
+      <p:sp>
+        <p:nvSpPr>
+          <p:cNvPr id="4" name="Slide Number Placeholder 3"/>
+          <p:cNvSpPr>
+            <a:spLocks noGrp="1"/>
+          </p:cNvSpPr>
+          <p:nvPr>
+            <p:ph type="sldNum" sz="quarter" idx="5"/>
+          </p:nvPr>
+        </p:nvSpPr>
+        <p:spPr/>
+        <p:txBody>
+          <a:bodyPr/>
+          <a:lstStyle/>
+          <a:p>
+            <a:fld id="{3DF2C5BF-46B2-4D7B-A949-6BFF11D34A9A}" type="slidenum">
+              <a:rPr lang="en-AU" smtClean="0"/>
+              <a:t>9</a:t>
             </a:fld>
             <a:endParaRPr lang="en-AU"/>
           </a:p>
@@ -901,7 +1190,7 @@
           <a:p>
             <a:fld id="{1B8826C0-98C7-4BD6-86EE-DBD69B901C1F}" type="datetimeFigureOut">
               <a:rPr lang="en-AU" smtClean="0"/>
-              <a:t>15/01/2020</a:t>
+              <a:t>17/01/2020</a:t>
             </a:fld>
             <a:endParaRPr lang="en-AU"/>
           </a:p>
@@ -1101,7 +1390,7 @@
           <a:p>
             <a:fld id="{1B8826C0-98C7-4BD6-86EE-DBD69B901C1F}" type="datetimeFigureOut">
               <a:rPr lang="en-AU" smtClean="0"/>
-              <a:t>15/01/2020</a:t>
+              <a:t>17/01/2020</a:t>
             </a:fld>
             <a:endParaRPr lang="en-AU"/>
           </a:p>
@@ -1311,7 +1600,7 @@
           <a:p>
             <a:fld id="{1B8826C0-98C7-4BD6-86EE-DBD69B901C1F}" type="datetimeFigureOut">
               <a:rPr lang="en-AU" smtClean="0"/>
-              <a:t>15/01/2020</a:t>
+              <a:t>17/01/2020</a:t>
             </a:fld>
             <a:endParaRPr lang="en-AU"/>
           </a:p>
@@ -1511,7 +1800,7 @@
           <a:p>
             <a:fld id="{1B8826C0-98C7-4BD6-86EE-DBD69B901C1F}" type="datetimeFigureOut">
               <a:rPr lang="en-AU" smtClean="0"/>
-              <a:t>15/01/2020</a:t>
+              <a:t>17/01/2020</a:t>
             </a:fld>
             <a:endParaRPr lang="en-AU"/>
           </a:p>
@@ -1787,7 +2076,7 @@
           <a:p>
             <a:fld id="{1B8826C0-98C7-4BD6-86EE-DBD69B901C1F}" type="datetimeFigureOut">
               <a:rPr lang="en-AU" smtClean="0"/>
-              <a:t>15/01/2020</a:t>
+              <a:t>17/01/2020</a:t>
             </a:fld>
             <a:endParaRPr lang="en-AU"/>
           </a:p>
@@ -2055,7 +2344,7 @@
           <a:p>
             <a:fld id="{1B8826C0-98C7-4BD6-86EE-DBD69B901C1F}" type="datetimeFigureOut">
               <a:rPr lang="en-AU" smtClean="0"/>
-              <a:t>15/01/2020</a:t>
+              <a:t>17/01/2020</a:t>
             </a:fld>
             <a:endParaRPr lang="en-AU"/>
           </a:p>
@@ -2470,7 +2759,7 @@
           <a:p>
             <a:fld id="{1B8826C0-98C7-4BD6-86EE-DBD69B901C1F}" type="datetimeFigureOut">
               <a:rPr lang="en-AU" smtClean="0"/>
-              <a:t>15/01/2020</a:t>
+              <a:t>17/01/2020</a:t>
             </a:fld>
             <a:endParaRPr lang="en-AU"/>
           </a:p>
@@ -2612,7 +2901,7 @@
           <a:p>
             <a:fld id="{1B8826C0-98C7-4BD6-86EE-DBD69B901C1F}" type="datetimeFigureOut">
               <a:rPr lang="en-AU" smtClean="0"/>
-              <a:t>15/01/2020</a:t>
+              <a:t>17/01/2020</a:t>
             </a:fld>
             <a:endParaRPr lang="en-AU"/>
           </a:p>
@@ -2725,7 +3014,7 @@
           <a:p>
             <a:fld id="{1B8826C0-98C7-4BD6-86EE-DBD69B901C1F}" type="datetimeFigureOut">
               <a:rPr lang="en-AU" smtClean="0"/>
-              <a:t>15/01/2020</a:t>
+              <a:t>17/01/2020</a:t>
             </a:fld>
             <a:endParaRPr lang="en-AU"/>
           </a:p>
@@ -3038,7 +3327,7 @@
           <a:p>
             <a:fld id="{1B8826C0-98C7-4BD6-86EE-DBD69B901C1F}" type="datetimeFigureOut">
               <a:rPr lang="en-AU" smtClean="0"/>
-              <a:t>15/01/2020</a:t>
+              <a:t>17/01/2020</a:t>
             </a:fld>
             <a:endParaRPr lang="en-AU"/>
           </a:p>
@@ -3327,7 +3616,7 @@
           <a:p>
             <a:fld id="{1B8826C0-98C7-4BD6-86EE-DBD69B901C1F}" type="datetimeFigureOut">
               <a:rPr lang="en-AU" smtClean="0"/>
-              <a:t>15/01/2020</a:t>
+              <a:t>17/01/2020</a:t>
             </a:fld>
             <a:endParaRPr lang="en-AU"/>
           </a:p>
@@ -3570,7 +3859,7 @@
           <a:p>
             <a:fld id="{1B8826C0-98C7-4BD6-86EE-DBD69B901C1F}" type="datetimeFigureOut">
               <a:rPr lang="en-AU" smtClean="0"/>
-              <a:t>15/01/2020</a:t>
+              <a:t>17/01/2020</a:t>
             </a:fld>
             <a:endParaRPr lang="en-AU"/>
           </a:p>
@@ -3987,107 +4276,12 @@
           <a:chExt cx="0" cy="0"/>
         </a:xfrm>
       </p:grpSpPr>
-      <p:sp>
-        <p:nvSpPr>
-          <p:cNvPr id="2" name="Title 1">
-            <a:extLst>
-              <a:ext uri="{FF2B5EF4-FFF2-40B4-BE49-F238E27FC236}">
-                <a16:creationId xmlns:a16="http://schemas.microsoft.com/office/drawing/2014/main" id="{B9C5D6A1-0582-4BBB-9334-271A1CDB7784}"/>
-              </a:ext>
-            </a:extLst>
-          </p:cNvPr>
-          <p:cNvSpPr>
-            <a:spLocks noGrp="1"/>
-          </p:cNvSpPr>
-          <p:nvPr>
-            <p:ph type="title"/>
-          </p:nvPr>
-        </p:nvSpPr>
-        <p:spPr/>
-        <p:txBody>
-          <a:bodyPr/>
-          <a:lstStyle/>
-          <a:p>
-            <a:r>
-              <a:rPr lang="en-AU" dirty="0"/>
-              <a:t>Factor similarities</a:t>
-            </a:r>
-          </a:p>
-        </p:txBody>
-      </p:sp>
-      <p:sp>
-        <p:nvSpPr>
-          <p:cNvPr id="3" name="Content Placeholder 2">
-            <a:extLst>
-              <a:ext uri="{FF2B5EF4-FFF2-40B4-BE49-F238E27FC236}">
-                <a16:creationId xmlns:a16="http://schemas.microsoft.com/office/drawing/2014/main" id="{7D6BB991-82C6-45C0-AC2C-D232184AD12B}"/>
-              </a:ext>
-            </a:extLst>
-          </p:cNvPr>
-          <p:cNvSpPr>
-            <a:spLocks noGrp="1"/>
-          </p:cNvSpPr>
-          <p:nvPr>
-            <p:ph idx="1"/>
-          </p:nvPr>
-        </p:nvSpPr>
-        <p:spPr>
-          <a:xfrm>
-            <a:off x="838200" y="1825625"/>
-            <a:ext cx="4738511" cy="4667250"/>
-          </a:xfrm>
-        </p:spPr>
-        <p:txBody>
-          <a:bodyPr>
-            <a:normAutofit/>
-          </a:bodyPr>
-          <a:lstStyle/>
-          <a:p>
-            <a:pPr marL="0" indent="0">
-              <a:buNone/>
-            </a:pPr>
-            <a:r>
-              <a:rPr lang="en-AU" dirty="0"/>
-              <a:t>Given multivariate data (p &gt; 3):</a:t>
-            </a:r>
-          </a:p>
-          <a:p>
-            <a:r>
-              <a:rPr lang="en-AU" dirty="0"/>
-              <a:t>Linear projection, down to 2 dimensions (a shadow!)</a:t>
-            </a:r>
-          </a:p>
-          <a:p>
-            <a:r>
-              <a:rPr lang="en-AU" dirty="0"/>
-              <a:t>Scatterplots</a:t>
-            </a:r>
-          </a:p>
-          <a:p>
-            <a:r>
-              <a:rPr lang="en-AU" dirty="0"/>
-              <a:t>This data has groups, sometimes </a:t>
-            </a:r>
-            <a:r>
-              <a:rPr lang="en-AU" dirty="0" err="1"/>
-              <a:t>colored</a:t>
-            </a:r>
-            <a:endParaRPr lang="en-AU" dirty="0"/>
-          </a:p>
-          <a:p>
-            <a:r>
-              <a:rPr lang="en-AU" dirty="0"/>
-              <a:t>Variable map depicts the basis (magnitude and direction each variable contributes)</a:t>
-            </a:r>
-          </a:p>
-        </p:txBody>
-      </p:sp>
       <p:pic>
         <p:nvPicPr>
-          <p:cNvPr id="5" name="Picture 4">
-            <a:extLst>
-              <a:ext uri="{FF2B5EF4-FFF2-40B4-BE49-F238E27FC236}">
-                <a16:creationId xmlns:a16="http://schemas.microsoft.com/office/drawing/2014/main" id="{3EE6B0DE-CF85-4263-A0F8-9103220C95CA}"/>
+          <p:cNvPr id="4" name="Picture 3">
+            <a:extLst>
+              <a:ext uri="{FF2B5EF4-FFF2-40B4-BE49-F238E27FC236}">
+                <a16:creationId xmlns:a16="http://schemas.microsoft.com/office/drawing/2014/main" id="{F63EDE5F-1B15-4A98-AF54-6642BBDB9A7D}"/>
               </a:ext>
             </a:extLst>
           </p:cNvPr>
@@ -4097,25 +4291,110 @@
           <p:nvPr/>
         </p:nvPicPr>
         <p:blipFill>
-          <a:blip r:embed="rId3"/>
+          <a:blip r:embed="rId2">
+            <a:extLst>
+              <a:ext uri="{BEBA8EAE-BF5A-486C-A8C5-ECC9F3942E4B}">
+                <a14:imgProps xmlns:a14="http://schemas.microsoft.com/office/drawing/2010/main">
+                  <a14:imgLayer r:embed="rId3">
+                    <a14:imgEffect>
+                      <a14:sharpenSoften amount="-46000"/>
+                    </a14:imgEffect>
+                    <a14:imgEffect>
+                      <a14:saturation sat="66000"/>
+                    </a14:imgEffect>
+                    <a14:imgEffect>
+                      <a14:brightnessContrast bright="13000" contrast="-15000"/>
+                    </a14:imgEffect>
+                  </a14:imgLayer>
+                </a14:imgProps>
+              </a:ext>
+            </a:extLst>
+          </a:blip>
           <a:stretch>
             <a:fillRect/>
           </a:stretch>
         </p:blipFill>
         <p:spPr>
           <a:xfrm>
-            <a:off x="5700889" y="789694"/>
-            <a:ext cx="6236613" cy="5387269"/>
+            <a:off x="1924493" y="0"/>
+            <a:ext cx="7938688" cy="6857544"/>
           </a:xfrm>
           <a:prstGeom prst="rect">
             <a:avLst/>
           </a:prstGeom>
         </p:spPr>
       </p:pic>
+      <p:sp>
+        <p:nvSpPr>
+          <p:cNvPr id="2" name="Title 1">
+            <a:extLst>
+              <a:ext uri="{FF2B5EF4-FFF2-40B4-BE49-F238E27FC236}">
+                <a16:creationId xmlns:a16="http://schemas.microsoft.com/office/drawing/2014/main" id="{F82DDCBB-0957-49C0-82E7-683C35C5FFF2}"/>
+              </a:ext>
+            </a:extLst>
+          </p:cNvPr>
+          <p:cNvSpPr>
+            <a:spLocks noGrp="1"/>
+          </p:cNvSpPr>
+          <p:nvPr>
+            <p:ph type="ctrTitle"/>
+          </p:nvPr>
+        </p:nvSpPr>
+        <p:spPr/>
+        <p:txBody>
+          <a:bodyPr>
+            <a:normAutofit/>
+          </a:bodyPr>
+          <a:lstStyle/>
+          <a:p>
+            <a:r>
+              <a:rPr lang="en-AU" sz="4800" b="1" dirty="0"/>
+              <a:t>Multivariate data visualization study</a:t>
+            </a:r>
+            <a:br>
+              <a:rPr lang="en-AU" dirty="0"/>
+            </a:br>
+            <a:endParaRPr lang="en-AU" dirty="0"/>
+          </a:p>
+        </p:txBody>
+      </p:sp>
+      <p:sp>
+        <p:nvSpPr>
+          <p:cNvPr id="3" name="Subtitle 2">
+            <a:extLst>
+              <a:ext uri="{FF2B5EF4-FFF2-40B4-BE49-F238E27FC236}">
+                <a16:creationId xmlns:a16="http://schemas.microsoft.com/office/drawing/2014/main" id="{1A16D1D1-7A2F-48B4-9DFC-5182D6905227}"/>
+              </a:ext>
+            </a:extLst>
+          </p:cNvPr>
+          <p:cNvSpPr>
+            <a:spLocks noGrp="1"/>
+          </p:cNvSpPr>
+          <p:nvPr>
+            <p:ph type="subTitle" idx="1"/>
+          </p:nvPr>
+        </p:nvSpPr>
+        <p:spPr/>
+        <p:txBody>
+          <a:bodyPr>
+            <a:normAutofit/>
+          </a:bodyPr>
+          <a:lstStyle/>
+          <a:p>
+            <a:r>
+              <a:rPr lang="en-AU" sz="3600" b="1" dirty="0"/>
+              <a:t>Training video</a:t>
+            </a:r>
+          </a:p>
+          <a:p>
+            <a:endParaRPr lang="en-AU" sz="3600" dirty="0"/>
+          </a:p>
+        </p:txBody>
+      </p:sp>
     </p:spTree>
     <p:extLst>
       <p:ext uri="{BB962C8B-B14F-4D97-AF65-F5344CB8AC3E}">
-        <p14:creationId xmlns:p14="http://schemas.microsoft.com/office/powerpoint/2010/main" val="3904538160"/>
+        <p14:creationId xmlns:p14="http://schemas.microsoft.com/office/powerpoint/2010/main" val="4089034759"/>
       </p:ext>
     </p:extLst>
   </p:cSld>
@@ -4147,7 +4426,7 @@
           <p:cNvPr id="2" name="Title 1">
             <a:extLst>
               <a:ext uri="{FF2B5EF4-FFF2-40B4-BE49-F238E27FC236}">
-                <a16:creationId xmlns:a16="http://schemas.microsoft.com/office/drawing/2014/main" id="{E6FF29C4-65F5-4F0E-8578-329EFD3DA2B8}"/>
+                <a16:creationId xmlns:a16="http://schemas.microsoft.com/office/drawing/2014/main" id="{B9C5D6A1-0582-4BBB-9334-271A1CDB7784}"/>
               </a:ext>
             </a:extLst>
           </p:cNvPr>
@@ -4165,7 +4444,7 @@
           <a:p>
             <a:r>
               <a:rPr lang="en-AU" dirty="0"/>
-              <a:t>Principal component analysis (PCA)</a:t>
+              <a:t>Linear projections</a:t>
             </a:r>
           </a:p>
         </p:txBody>
@@ -4175,7 +4454,7 @@
           <p:cNvPr id="3" name="Content Placeholder 2">
             <a:extLst>
               <a:ext uri="{FF2B5EF4-FFF2-40B4-BE49-F238E27FC236}">
-                <a16:creationId xmlns:a16="http://schemas.microsoft.com/office/drawing/2014/main" id="{42C23761-2E86-482F-976B-991BB1CC39A4}"/>
+                <a16:creationId xmlns:a16="http://schemas.microsoft.com/office/drawing/2014/main" id="{7D6BB991-82C6-45C0-AC2C-D232184AD12B}"/>
               </a:ext>
             </a:extLst>
           </p:cNvPr>
@@ -4189,7 +4468,7 @@
         <p:spPr>
           <a:xfrm>
             <a:off x="838200" y="1825625"/>
-            <a:ext cx="4950041" cy="4351338"/>
+            <a:ext cx="4738511" cy="4667250"/>
           </a:xfrm>
         </p:spPr>
         <p:txBody>
@@ -4203,41 +4482,46 @@
             </a:pPr>
             <a:r>
               <a:rPr lang="en-AU" dirty="0"/>
-              <a:t>Defines principal components:</a:t>
+              <a:t>Given multivariate data (p &gt; 3):</a:t>
             </a:r>
           </a:p>
           <a:p>
             <a:r>
               <a:rPr lang="en-AU" dirty="0"/>
-              <a:t>Explain the most remaining variation</a:t>
+              <a:t>Linear projection, down to 2 dimensions (a shadow!)</a:t>
             </a:r>
           </a:p>
           <a:p>
             <a:r>
               <a:rPr lang="en-AU" dirty="0"/>
-              <a:t>Orthogonal (at right angles)</a:t>
+              <a:t>Scatterplots</a:t>
             </a:r>
           </a:p>
           <a:p>
             <a:r>
               <a:rPr lang="en-AU" dirty="0"/>
-              <a:t>Ordered in decreasing variation</a:t>
-            </a:r>
+              <a:t>This data has groups, sometimes </a:t>
+            </a:r>
+            <a:r>
+              <a:rPr lang="en-AU" dirty="0" err="1"/>
+              <a:t>colored</a:t>
+            </a:r>
+            <a:endParaRPr lang="en-AU" dirty="0"/>
           </a:p>
           <a:p>
             <a:r>
               <a:rPr lang="en-AU" dirty="0"/>
-              <a:t>Plot a pair of these principal components</a:t>
+              <a:t>Variable map depicts the basis (magnitude and direction each variable contributes)</a:t>
             </a:r>
           </a:p>
         </p:txBody>
       </p:sp>
       <p:pic>
         <p:nvPicPr>
-          <p:cNvPr id="4" name="Picture 3">
-            <a:extLst>
-              <a:ext uri="{FF2B5EF4-FFF2-40B4-BE49-F238E27FC236}">
-                <a16:creationId xmlns:a16="http://schemas.microsoft.com/office/drawing/2014/main" id="{8D401809-CE56-479D-B5D8-C6B4BB609951}"/>
+          <p:cNvPr id="5" name="Picture 4">
+            <a:extLst>
+              <a:ext uri="{FF2B5EF4-FFF2-40B4-BE49-F238E27FC236}">
+                <a16:creationId xmlns:a16="http://schemas.microsoft.com/office/drawing/2014/main" id="{3EE6B0DE-CF85-4263-A0F8-9103220C95CA}"/>
               </a:ext>
             </a:extLst>
           </p:cNvPr>
@@ -4254,8 +4538,8 @@
         </p:blipFill>
         <p:spPr>
           <a:xfrm>
-            <a:off x="6095999" y="1355851"/>
-            <a:ext cx="5257801" cy="5137024"/>
+            <a:off x="5700889" y="789694"/>
+            <a:ext cx="6236613" cy="5387269"/>
           </a:xfrm>
           <a:prstGeom prst="rect">
             <a:avLst/>
@@ -4265,7 +4549,7 @@
     </p:spTree>
     <p:extLst>
       <p:ext uri="{BB962C8B-B14F-4D97-AF65-F5344CB8AC3E}">
-        <p14:creationId xmlns:p14="http://schemas.microsoft.com/office/powerpoint/2010/main" val="2740550696"/>
+        <p14:creationId xmlns:p14="http://schemas.microsoft.com/office/powerpoint/2010/main" val="4287306123"/>
       </p:ext>
     </p:extLst>
   </p:cSld>
@@ -4297,7 +4581,7 @@
           <p:cNvPr id="2" name="Title 1">
             <a:extLst>
               <a:ext uri="{FF2B5EF4-FFF2-40B4-BE49-F238E27FC236}">
-                <a16:creationId xmlns:a16="http://schemas.microsoft.com/office/drawing/2014/main" id="{D5BB406E-3C61-454C-A89C-7A2863DF1D3C}"/>
+                <a16:creationId xmlns:a16="http://schemas.microsoft.com/office/drawing/2014/main" id="{E6FF29C4-65F5-4F0E-8578-329EFD3DA2B8}"/>
               </a:ext>
             </a:extLst>
           </p:cNvPr>
@@ -4315,7 +4599,7 @@
           <a:p>
             <a:r>
               <a:rPr lang="en-AU" dirty="0"/>
-              <a:t>Grand tour</a:t>
+              <a:t>Principal component analysis (PCA)</a:t>
             </a:r>
           </a:p>
         </p:txBody>
@@ -4325,7 +4609,7 @@
           <p:cNvPr id="3" name="Content Placeholder 2">
             <a:extLst>
               <a:ext uri="{FF2B5EF4-FFF2-40B4-BE49-F238E27FC236}">
-                <a16:creationId xmlns:a16="http://schemas.microsoft.com/office/drawing/2014/main" id="{732F5234-CBCB-488F-965C-B8060D05F980}"/>
+                <a16:creationId xmlns:a16="http://schemas.microsoft.com/office/drawing/2014/main" id="{42C23761-2E86-482F-976B-991BB1CC39A4}"/>
               </a:ext>
             </a:extLst>
           </p:cNvPr>
@@ -4339,38 +4623,55 @@
         <p:spPr>
           <a:xfrm>
             <a:off x="838200" y="1825625"/>
-            <a:ext cx="4044518" cy="4351338"/>
+            <a:ext cx="4950041" cy="4351338"/>
           </a:xfrm>
         </p:spPr>
         <p:txBody>
-          <a:bodyPr/>
-          <a:lstStyle/>
-          <a:p>
+          <a:bodyPr>
+            <a:normAutofit/>
+          </a:bodyPr>
+          <a:lstStyle/>
+          <a:p>
+            <a:pPr marL="0" indent="0">
+              <a:buNone/>
+            </a:pPr>
             <a:r>
               <a:rPr lang="en-AU" dirty="0"/>
-              <a:t>Identifies a few random planes</a:t>
+              <a:t>Defines principal components:</a:t>
             </a:r>
           </a:p>
           <a:p>
             <a:r>
               <a:rPr lang="en-AU" dirty="0"/>
-              <a:t>Interpolates many planes between them</a:t>
+              <a:t>Explain the most remaining variation</a:t>
             </a:r>
           </a:p>
           <a:p>
             <a:r>
               <a:rPr lang="en-AU" dirty="0"/>
-              <a:t>Viewed as an animation of these planes</a:t>
+              <a:t>Orthogonal (at right angles)</a:t>
+            </a:r>
+          </a:p>
+          <a:p>
+            <a:r>
+              <a:rPr lang="en-AU" dirty="0"/>
+              <a:t>Ordered in decreasing variation</a:t>
+            </a:r>
+          </a:p>
+          <a:p>
+            <a:r>
+              <a:rPr lang="en-AU" dirty="0"/>
+              <a:t>Plot a pair of these principal components</a:t>
             </a:r>
           </a:p>
         </p:txBody>
       </p:sp>
       <p:pic>
         <p:nvPicPr>
-          <p:cNvPr id="5" name="Picture 4">
-            <a:extLst>
-              <a:ext uri="{FF2B5EF4-FFF2-40B4-BE49-F238E27FC236}">
-                <a16:creationId xmlns:a16="http://schemas.microsoft.com/office/drawing/2014/main" id="{96361534-031D-401B-BB03-B7D220F2106B}"/>
+          <p:cNvPr id="6" name="Picture 5">
+            <a:extLst>
+              <a:ext uri="{FF2B5EF4-FFF2-40B4-BE49-F238E27FC236}">
+                <a16:creationId xmlns:a16="http://schemas.microsoft.com/office/drawing/2014/main" id="{24ABB0F1-4AC4-48C1-AC5D-C266F19200BE}"/>
               </a:ext>
             </a:extLst>
           </p:cNvPr>
@@ -4380,25 +4681,36 @@
           <p:nvPr/>
         </p:nvPicPr>
         <p:blipFill>
-          <a:blip r:embed="rId2"/>
+          <a:blip r:embed="rId3">
+            <a:extLst>
+              <a:ext uri="{28A0092B-C50C-407E-A947-70E740481C1C}">
+                <a14:useLocalDpi xmlns:a14="http://schemas.microsoft.com/office/drawing/2010/main" val="0"/>
+              </a:ext>
+            </a:extLst>
+          </a:blip>
           <a:stretch>
             <a:fillRect/>
           </a:stretch>
         </p:blipFill>
         <p:spPr>
           <a:xfrm>
-            <a:off x="4669654" y="1267782"/>
-            <a:ext cx="6684146" cy="4408692"/>
+            <a:off x="6003722" y="1776681"/>
+            <a:ext cx="5820386" cy="4400282"/>
           </a:xfrm>
           <a:prstGeom prst="rect">
             <a:avLst/>
           </a:prstGeom>
+          <a:ln>
+            <a:solidFill>
+              <a:schemeClr val="tx1"/>
+            </a:solidFill>
+          </a:ln>
         </p:spPr>
       </p:pic>
     </p:spTree>
     <p:extLst>
       <p:ext uri="{BB962C8B-B14F-4D97-AF65-F5344CB8AC3E}">
-        <p14:creationId xmlns:p14="http://schemas.microsoft.com/office/powerpoint/2010/main" val="1154944922"/>
+        <p14:creationId xmlns:p14="http://schemas.microsoft.com/office/powerpoint/2010/main" val="4270161177"/>
       </p:ext>
     </p:extLst>
   </p:cSld>
@@ -4430,6 +4742,888 @@
           <p:cNvPr id="2" name="Title 1">
             <a:extLst>
               <a:ext uri="{FF2B5EF4-FFF2-40B4-BE49-F238E27FC236}">
+                <a16:creationId xmlns:a16="http://schemas.microsoft.com/office/drawing/2014/main" id="{D5BB406E-3C61-454C-A89C-7A2863DF1D3C}"/>
+              </a:ext>
+            </a:extLst>
+          </p:cNvPr>
+          <p:cNvSpPr>
+            <a:spLocks noGrp="1"/>
+          </p:cNvSpPr>
+          <p:nvPr>
+            <p:ph type="title"/>
+          </p:nvPr>
+        </p:nvSpPr>
+        <p:spPr/>
+        <p:txBody>
+          <a:bodyPr/>
+          <a:lstStyle/>
+          <a:p>
+            <a:r>
+              <a:rPr lang="en-AU" dirty="0"/>
+              <a:t>Grand tour</a:t>
+            </a:r>
+          </a:p>
+        </p:txBody>
+      </p:sp>
+      <p:sp>
+        <p:nvSpPr>
+          <p:cNvPr id="3" name="Content Placeholder 2">
+            <a:extLst>
+              <a:ext uri="{FF2B5EF4-FFF2-40B4-BE49-F238E27FC236}">
+                <a16:creationId xmlns:a16="http://schemas.microsoft.com/office/drawing/2014/main" id="{732F5234-CBCB-488F-965C-B8060D05F980}"/>
+              </a:ext>
+            </a:extLst>
+          </p:cNvPr>
+          <p:cNvSpPr>
+            <a:spLocks noGrp="1"/>
+          </p:cNvSpPr>
+          <p:nvPr>
+            <p:ph idx="1"/>
+          </p:nvPr>
+        </p:nvSpPr>
+        <p:spPr>
+          <a:xfrm>
+            <a:off x="838200" y="1825625"/>
+            <a:ext cx="4044518" cy="4351338"/>
+          </a:xfrm>
+        </p:spPr>
+        <p:txBody>
+          <a:bodyPr/>
+          <a:lstStyle/>
+          <a:p>
+            <a:r>
+              <a:rPr lang="en-AU" dirty="0"/>
+              <a:t>Identifies a few random planes</a:t>
+            </a:r>
+          </a:p>
+          <a:p>
+            <a:r>
+              <a:rPr lang="en-AU" dirty="0"/>
+              <a:t>Interpolates many planes between them</a:t>
+            </a:r>
+          </a:p>
+          <a:p>
+            <a:r>
+              <a:rPr lang="en-AU" dirty="0"/>
+              <a:t>Viewed as an animation of these planes</a:t>
+            </a:r>
+          </a:p>
+        </p:txBody>
+      </p:sp>
+      <p:pic>
+        <p:nvPicPr>
+          <p:cNvPr id="1026" name="Picture 2" descr="CopyOfFleaHolesTour.gif">
+            <a:extLst>
+              <a:ext uri="{FF2B5EF4-FFF2-40B4-BE49-F238E27FC236}">
+                <a16:creationId xmlns:a16="http://schemas.microsoft.com/office/drawing/2014/main" id="{16FDEE2B-944D-4FF1-BD8A-48CB33E4114C}"/>
+              </a:ext>
+            </a:extLst>
+          </p:cNvPr>
+          <p:cNvPicPr>
+            <a:picLocks noChangeAspect="1" noChangeArrowheads="1" noCrop="1"/>
+          </p:cNvPicPr>
+          <p:nvPr/>
+        </p:nvPicPr>
+        <p:blipFill>
+          <a:blip r:embed="rId2">
+            <a:extLst>
+              <a:ext uri="{28A0092B-C50C-407E-A947-70E740481C1C}">
+                <a14:useLocalDpi xmlns:a14="http://schemas.microsoft.com/office/drawing/2010/main" val="0"/>
+              </a:ext>
+            </a:extLst>
+          </a:blip>
+          <a:srcRect/>
+          <a:stretch>
+            <a:fillRect/>
+          </a:stretch>
+        </p:blipFill>
+        <p:spPr bwMode="auto">
+          <a:xfrm>
+            <a:off x="5638800" y="571500"/>
+            <a:ext cx="5715000" cy="5715000"/>
+          </a:xfrm>
+          <a:prstGeom prst="rect">
+            <a:avLst/>
+          </a:prstGeom>
+          <a:noFill/>
+          <a:extLst>
+            <a:ext uri="{909E8E84-426E-40DD-AFC4-6F175D3DCCD1}">
+              <a14:hiddenFill xmlns:a14="http://schemas.microsoft.com/office/drawing/2010/main">
+                <a:solidFill>
+                  <a:srgbClr val="FFFFFF"/>
+                </a:solidFill>
+              </a14:hiddenFill>
+            </a:ext>
+          </a:extLst>
+        </p:spPr>
+      </p:pic>
+    </p:spTree>
+    <p:extLst>
+      <p:ext uri="{BB962C8B-B14F-4D97-AF65-F5344CB8AC3E}">
+        <p14:creationId xmlns:p14="http://schemas.microsoft.com/office/powerpoint/2010/main" val="3021800790"/>
+      </p:ext>
+    </p:extLst>
+  </p:cSld>
+  <p:clrMapOvr>
+    <a:masterClrMapping/>
+  </p:clrMapOvr>
+</p:sld>
+</file>
+
+<file path=ppt/slides/slide5.xml><?xml version="1.0" encoding="utf-8"?>
+<p:sld xmlns:a="http://schemas.openxmlformats.org/drawingml/2006/main" xmlns:r="http://schemas.openxmlformats.org/officeDocument/2006/relationships" xmlns:p="http://schemas.openxmlformats.org/presentationml/2006/main">
+  <p:cSld>
+    <p:spTree>
+      <p:nvGrpSpPr>
+        <p:cNvPr id="1" name=""/>
+        <p:cNvGrpSpPr/>
+        <p:nvPr/>
+      </p:nvGrpSpPr>
+      <p:grpSpPr>
+        <a:xfrm>
+          <a:off x="0" y="0"/>
+          <a:ext cx="0" cy="0"/>
+          <a:chOff x="0" y="0"/>
+          <a:chExt cx="0" cy="0"/>
+        </a:xfrm>
+      </p:grpSpPr>
+      <p:sp>
+        <p:nvSpPr>
+          <p:cNvPr id="2" name="Title 1">
+            <a:extLst>
+              <a:ext uri="{FF2B5EF4-FFF2-40B4-BE49-F238E27FC236}">
+                <a16:creationId xmlns:a16="http://schemas.microsoft.com/office/drawing/2014/main" id="{112E2701-D08C-40CF-BABF-D8F9C0362757}"/>
+              </a:ext>
+            </a:extLst>
+          </p:cNvPr>
+          <p:cNvSpPr>
+            <a:spLocks noGrp="1"/>
+          </p:cNvSpPr>
+          <p:nvPr>
+            <p:ph type="title"/>
+          </p:nvPr>
+        </p:nvSpPr>
+        <p:spPr/>
+        <p:txBody>
+          <a:bodyPr/>
+          <a:lstStyle/>
+          <a:p>
+            <a:r>
+              <a:rPr lang="en-AU" dirty="0"/>
+              <a:t>Manual tour</a:t>
+            </a:r>
+          </a:p>
+        </p:txBody>
+      </p:sp>
+      <p:sp>
+        <p:nvSpPr>
+          <p:cNvPr id="3" name="Content Placeholder 2">
+            <a:extLst>
+              <a:ext uri="{FF2B5EF4-FFF2-40B4-BE49-F238E27FC236}">
+                <a16:creationId xmlns:a16="http://schemas.microsoft.com/office/drawing/2014/main" id="{C55CDB9B-5EBD-4F6E-9214-DBF3BA1D55CC}"/>
+              </a:ext>
+            </a:extLst>
+          </p:cNvPr>
+          <p:cNvSpPr>
+            <a:spLocks noGrp="1"/>
+          </p:cNvSpPr>
+          <p:nvPr>
+            <p:ph idx="1"/>
+          </p:nvPr>
+        </p:nvSpPr>
+        <p:spPr>
+          <a:xfrm>
+            <a:off x="838200" y="1825625"/>
+            <a:ext cx="5162550" cy="4351338"/>
+          </a:xfrm>
+        </p:spPr>
+        <p:txBody>
+          <a:bodyPr/>
+          <a:lstStyle/>
+          <a:p>
+            <a:r>
+              <a:rPr lang="en-AU" dirty="0"/>
+              <a:t>Manipulates a selected variables contribution to the basis</a:t>
+            </a:r>
+          </a:p>
+          <a:p>
+            <a:r>
+              <a:rPr lang="en-AU" dirty="0"/>
+              <a:t>Contributions of other variables move (fixed shape of the data)</a:t>
+            </a:r>
+          </a:p>
+          <a:p>
+            <a:r>
+              <a:rPr lang="en-AU" dirty="0"/>
+              <a:t>Allows for user interaction to choose a path</a:t>
+            </a:r>
+          </a:p>
+        </p:txBody>
+      </p:sp>
+      <p:pic>
+        <p:nvPicPr>
+          <p:cNvPr id="6" name="Picture 5">
+            <a:extLst>
+              <a:ext uri="{FF2B5EF4-FFF2-40B4-BE49-F238E27FC236}">
+                <a16:creationId xmlns:a16="http://schemas.microsoft.com/office/drawing/2014/main" id="{E803D0C6-A13D-42A2-ABEA-BDFD7B316172}"/>
+              </a:ext>
+            </a:extLst>
+          </p:cNvPr>
+          <p:cNvPicPr>
+            <a:picLocks noChangeAspect="1"/>
+          </p:cNvPicPr>
+          <p:nvPr/>
+        </p:nvPicPr>
+        <p:blipFill>
+          <a:blip r:embed="rId3">
+            <a:extLst>
+              <a:ext uri="{28A0092B-C50C-407E-A947-70E740481C1C}">
+                <a14:useLocalDpi xmlns:a14="http://schemas.microsoft.com/office/drawing/2010/main" val="0"/>
+              </a:ext>
+            </a:extLst>
+          </a:blip>
+          <a:stretch>
+            <a:fillRect/>
+          </a:stretch>
+        </p:blipFill>
+        <p:spPr>
+          <a:xfrm>
+            <a:off x="6704202" y="1604963"/>
+            <a:ext cx="4572000" cy="4572000"/>
+          </a:xfrm>
+          <a:prstGeom prst="rect">
+            <a:avLst/>
+          </a:prstGeom>
+          <a:ln>
+            <a:solidFill>
+              <a:schemeClr val="tx1"/>
+            </a:solidFill>
+          </a:ln>
+        </p:spPr>
+      </p:pic>
+    </p:spTree>
+    <p:extLst>
+      <p:ext uri="{BB962C8B-B14F-4D97-AF65-F5344CB8AC3E}">
+        <p14:creationId xmlns:p14="http://schemas.microsoft.com/office/powerpoint/2010/main" val="251644546"/>
+      </p:ext>
+    </p:extLst>
+  </p:cSld>
+  <p:clrMapOvr>
+    <a:masterClrMapping/>
+  </p:clrMapOvr>
+</p:sld>
+</file>
+
+<file path=ppt/slides/slide6.xml><?xml version="1.0" encoding="utf-8"?>
+<p:sld xmlns:a="http://schemas.openxmlformats.org/drawingml/2006/main" xmlns:r="http://schemas.openxmlformats.org/officeDocument/2006/relationships" xmlns:p="http://schemas.openxmlformats.org/presentationml/2006/main">
+  <p:cSld>
+    <p:spTree>
+      <p:nvGrpSpPr>
+        <p:cNvPr id="1" name=""/>
+        <p:cNvGrpSpPr/>
+        <p:nvPr/>
+      </p:nvGrpSpPr>
+      <p:grpSpPr>
+        <a:xfrm>
+          <a:off x="0" y="0"/>
+          <a:ext cx="0" cy="0"/>
+          <a:chOff x="0" y="0"/>
+          <a:chExt cx="0" cy="0"/>
+        </a:xfrm>
+      </p:grpSpPr>
+      <p:sp>
+        <p:nvSpPr>
+          <p:cNvPr id="2" name="Title 1">
+            <a:extLst>
+              <a:ext uri="{FF2B5EF4-FFF2-40B4-BE49-F238E27FC236}">
+                <a16:creationId xmlns:a16="http://schemas.microsoft.com/office/drawing/2014/main" id="{B9C5D6A1-0582-4BBB-9334-271A1CDB7784}"/>
+              </a:ext>
+            </a:extLst>
+          </p:cNvPr>
+          <p:cNvSpPr>
+            <a:spLocks noGrp="1"/>
+          </p:cNvSpPr>
+          <p:nvPr>
+            <p:ph type="title"/>
+          </p:nvPr>
+        </p:nvSpPr>
+        <p:spPr/>
+        <p:txBody>
+          <a:bodyPr/>
+          <a:lstStyle/>
+          <a:p>
+            <a:r>
+              <a:rPr lang="en-AU" dirty="0"/>
+              <a:t>Factor similarities</a:t>
+            </a:r>
+          </a:p>
+        </p:txBody>
+      </p:sp>
+      <p:sp>
+        <p:nvSpPr>
+          <p:cNvPr id="3" name="Content Placeholder 2">
+            <a:extLst>
+              <a:ext uri="{FF2B5EF4-FFF2-40B4-BE49-F238E27FC236}">
+                <a16:creationId xmlns:a16="http://schemas.microsoft.com/office/drawing/2014/main" id="{7D6BB991-82C6-45C0-AC2C-D232184AD12B}"/>
+              </a:ext>
+            </a:extLst>
+          </p:cNvPr>
+          <p:cNvSpPr>
+            <a:spLocks noGrp="1"/>
+          </p:cNvSpPr>
+          <p:nvPr>
+            <p:ph idx="1"/>
+          </p:nvPr>
+        </p:nvSpPr>
+        <p:spPr>
+          <a:xfrm>
+            <a:off x="838200" y="1825625"/>
+            <a:ext cx="4738511" cy="4667250"/>
+          </a:xfrm>
+        </p:spPr>
+        <p:txBody>
+          <a:bodyPr>
+            <a:normAutofit/>
+          </a:bodyPr>
+          <a:lstStyle/>
+          <a:p>
+            <a:pPr marL="0" indent="0">
+              <a:buNone/>
+            </a:pPr>
+            <a:r>
+              <a:rPr lang="en-AU" dirty="0"/>
+              <a:t>Given multivariate data (p &gt; 3):</a:t>
+            </a:r>
+          </a:p>
+          <a:p>
+            <a:r>
+              <a:rPr lang="en-AU" dirty="0"/>
+              <a:t>Linear projection, down to 2 dimensions (a shadow!)</a:t>
+            </a:r>
+          </a:p>
+          <a:p>
+            <a:r>
+              <a:rPr lang="en-AU" dirty="0"/>
+              <a:t>Scatterplots</a:t>
+            </a:r>
+          </a:p>
+          <a:p>
+            <a:r>
+              <a:rPr lang="en-AU" dirty="0"/>
+              <a:t>This data has groups, sometimes </a:t>
+            </a:r>
+            <a:r>
+              <a:rPr lang="en-AU" dirty="0" err="1"/>
+              <a:t>colored</a:t>
+            </a:r>
+            <a:endParaRPr lang="en-AU" dirty="0"/>
+          </a:p>
+          <a:p>
+            <a:r>
+              <a:rPr lang="en-AU" dirty="0"/>
+              <a:t>Variable map depicts the basis (magnitude and direction each variable contributes)</a:t>
+            </a:r>
+          </a:p>
+        </p:txBody>
+      </p:sp>
+      <p:pic>
+        <p:nvPicPr>
+          <p:cNvPr id="5" name="Picture 4">
+            <a:extLst>
+              <a:ext uri="{FF2B5EF4-FFF2-40B4-BE49-F238E27FC236}">
+                <a16:creationId xmlns:a16="http://schemas.microsoft.com/office/drawing/2014/main" id="{3EE6B0DE-CF85-4263-A0F8-9103220C95CA}"/>
+              </a:ext>
+            </a:extLst>
+          </p:cNvPr>
+          <p:cNvPicPr>
+            <a:picLocks noChangeAspect="1"/>
+          </p:cNvPicPr>
+          <p:nvPr/>
+        </p:nvPicPr>
+        <p:blipFill>
+          <a:blip r:embed="rId3"/>
+          <a:stretch>
+            <a:fillRect/>
+          </a:stretch>
+        </p:blipFill>
+        <p:spPr>
+          <a:xfrm>
+            <a:off x="5700889" y="789694"/>
+            <a:ext cx="6236613" cy="5387269"/>
+          </a:xfrm>
+          <a:prstGeom prst="rect">
+            <a:avLst/>
+          </a:prstGeom>
+        </p:spPr>
+      </p:pic>
+      <p:sp>
+        <p:nvSpPr>
+          <p:cNvPr id="4" name="Rectangle 3">
+            <a:extLst>
+              <a:ext uri="{FF2B5EF4-FFF2-40B4-BE49-F238E27FC236}">
+                <a16:creationId xmlns:a16="http://schemas.microsoft.com/office/drawing/2014/main" id="{ECFDF082-6D13-4B59-AF39-62F9EF677E3F}"/>
+              </a:ext>
+            </a:extLst>
+          </p:cNvPr>
+          <p:cNvSpPr/>
+          <p:nvPr/>
+        </p:nvSpPr>
+        <p:spPr>
+          <a:xfrm rot="1009859">
+            <a:off x="1454360" y="1764794"/>
+            <a:ext cx="5629298" cy="923330"/>
+          </a:xfrm>
+          <a:prstGeom prst="rect">
+            <a:avLst/>
+          </a:prstGeom>
+          <a:noFill/>
+        </p:spPr>
+        <p:txBody>
+          <a:bodyPr wrap="none" lIns="91440" tIns="45720" rIns="91440" bIns="45720">
+            <a:spAutoFit/>
+          </a:bodyPr>
+          <a:lstStyle/>
+          <a:p>
+            <a:pPr algn="ctr"/>
+            <a:r>
+              <a:rPr lang="en-US" sz="5400" b="1" cap="none" spc="0" dirty="0">
+                <a:ln w="22225">
+                  <a:solidFill>
+                    <a:schemeClr val="accent2"/>
+                  </a:solidFill>
+                  <a:prstDash val="solid"/>
+                </a:ln>
+                <a:solidFill>
+                  <a:schemeClr val="accent2">
+                    <a:lumMod val="40000"/>
+                    <a:lumOff val="60000"/>
+                  </a:schemeClr>
+                </a:solidFill>
+                <a:effectLst/>
+              </a:rPr>
+              <a:t>OLD – DO NOT USE</a:t>
+            </a:r>
+          </a:p>
+        </p:txBody>
+      </p:sp>
+    </p:spTree>
+    <p:extLst>
+      <p:ext uri="{BB962C8B-B14F-4D97-AF65-F5344CB8AC3E}">
+        <p14:creationId xmlns:p14="http://schemas.microsoft.com/office/powerpoint/2010/main" val="3904538160"/>
+      </p:ext>
+    </p:extLst>
+  </p:cSld>
+  <p:clrMapOvr>
+    <a:masterClrMapping/>
+  </p:clrMapOvr>
+</p:sld>
+</file>
+
+<file path=ppt/slides/slide7.xml><?xml version="1.0" encoding="utf-8"?>
+<p:sld xmlns:a="http://schemas.openxmlformats.org/drawingml/2006/main" xmlns:r="http://schemas.openxmlformats.org/officeDocument/2006/relationships" xmlns:p="http://schemas.openxmlformats.org/presentationml/2006/main">
+  <p:cSld>
+    <p:spTree>
+      <p:nvGrpSpPr>
+        <p:cNvPr id="1" name=""/>
+        <p:cNvGrpSpPr/>
+        <p:nvPr/>
+      </p:nvGrpSpPr>
+      <p:grpSpPr>
+        <a:xfrm>
+          <a:off x="0" y="0"/>
+          <a:ext cx="0" cy="0"/>
+          <a:chOff x="0" y="0"/>
+          <a:chExt cx="0" cy="0"/>
+        </a:xfrm>
+      </p:grpSpPr>
+      <p:sp>
+        <p:nvSpPr>
+          <p:cNvPr id="2" name="Title 1">
+            <a:extLst>
+              <a:ext uri="{FF2B5EF4-FFF2-40B4-BE49-F238E27FC236}">
+                <a16:creationId xmlns:a16="http://schemas.microsoft.com/office/drawing/2014/main" id="{E6FF29C4-65F5-4F0E-8578-329EFD3DA2B8}"/>
+              </a:ext>
+            </a:extLst>
+          </p:cNvPr>
+          <p:cNvSpPr>
+            <a:spLocks noGrp="1"/>
+          </p:cNvSpPr>
+          <p:nvPr>
+            <p:ph type="title"/>
+          </p:nvPr>
+        </p:nvSpPr>
+        <p:spPr/>
+        <p:txBody>
+          <a:bodyPr/>
+          <a:lstStyle/>
+          <a:p>
+            <a:r>
+              <a:rPr lang="en-AU" dirty="0"/>
+              <a:t>Principal component analysis (PCA)</a:t>
+            </a:r>
+          </a:p>
+        </p:txBody>
+      </p:sp>
+      <p:sp>
+        <p:nvSpPr>
+          <p:cNvPr id="3" name="Content Placeholder 2">
+            <a:extLst>
+              <a:ext uri="{FF2B5EF4-FFF2-40B4-BE49-F238E27FC236}">
+                <a16:creationId xmlns:a16="http://schemas.microsoft.com/office/drawing/2014/main" id="{42C23761-2E86-482F-976B-991BB1CC39A4}"/>
+              </a:ext>
+            </a:extLst>
+          </p:cNvPr>
+          <p:cNvSpPr>
+            <a:spLocks noGrp="1"/>
+          </p:cNvSpPr>
+          <p:nvPr>
+            <p:ph idx="1"/>
+          </p:nvPr>
+        </p:nvSpPr>
+        <p:spPr>
+          <a:xfrm>
+            <a:off x="838200" y="1825625"/>
+            <a:ext cx="4950041" cy="4351338"/>
+          </a:xfrm>
+        </p:spPr>
+        <p:txBody>
+          <a:bodyPr>
+            <a:normAutofit/>
+          </a:bodyPr>
+          <a:lstStyle/>
+          <a:p>
+            <a:pPr marL="0" indent="0">
+              <a:buNone/>
+            </a:pPr>
+            <a:r>
+              <a:rPr lang="en-AU" dirty="0"/>
+              <a:t>Defines principal components:</a:t>
+            </a:r>
+          </a:p>
+          <a:p>
+            <a:r>
+              <a:rPr lang="en-AU" dirty="0"/>
+              <a:t>Explain the most remaining variation</a:t>
+            </a:r>
+          </a:p>
+          <a:p>
+            <a:r>
+              <a:rPr lang="en-AU" dirty="0"/>
+              <a:t>Orthogonal (at right angles)</a:t>
+            </a:r>
+          </a:p>
+          <a:p>
+            <a:r>
+              <a:rPr lang="en-AU" dirty="0"/>
+              <a:t>Ordered in decreasing variation</a:t>
+            </a:r>
+          </a:p>
+          <a:p>
+            <a:r>
+              <a:rPr lang="en-AU" dirty="0"/>
+              <a:t>Plot a pair of these principal components</a:t>
+            </a:r>
+          </a:p>
+        </p:txBody>
+      </p:sp>
+      <p:pic>
+        <p:nvPicPr>
+          <p:cNvPr id="4" name="Picture 3">
+            <a:extLst>
+              <a:ext uri="{FF2B5EF4-FFF2-40B4-BE49-F238E27FC236}">
+                <a16:creationId xmlns:a16="http://schemas.microsoft.com/office/drawing/2014/main" id="{8D401809-CE56-479D-B5D8-C6B4BB609951}"/>
+              </a:ext>
+            </a:extLst>
+          </p:cNvPr>
+          <p:cNvPicPr>
+            <a:picLocks noChangeAspect="1"/>
+          </p:cNvPicPr>
+          <p:nvPr/>
+        </p:nvPicPr>
+        <p:blipFill>
+          <a:blip r:embed="rId3"/>
+          <a:stretch>
+            <a:fillRect/>
+          </a:stretch>
+        </p:blipFill>
+        <p:spPr>
+          <a:xfrm>
+            <a:off x="6095999" y="1355851"/>
+            <a:ext cx="5257801" cy="5137024"/>
+          </a:xfrm>
+          <a:prstGeom prst="rect">
+            <a:avLst/>
+          </a:prstGeom>
+        </p:spPr>
+      </p:pic>
+      <p:sp>
+        <p:nvSpPr>
+          <p:cNvPr id="5" name="Rectangle 4">
+            <a:extLst>
+              <a:ext uri="{FF2B5EF4-FFF2-40B4-BE49-F238E27FC236}">
+                <a16:creationId xmlns:a16="http://schemas.microsoft.com/office/drawing/2014/main" id="{2BA45572-3C45-4D74-B23C-ECD6F7F6B310}"/>
+              </a:ext>
+            </a:extLst>
+          </p:cNvPr>
+          <p:cNvSpPr/>
+          <p:nvPr/>
+        </p:nvSpPr>
+        <p:spPr>
+          <a:xfrm rot="1009859">
+            <a:off x="1454360" y="1764794"/>
+            <a:ext cx="5629298" cy="923330"/>
+          </a:xfrm>
+          <a:prstGeom prst="rect">
+            <a:avLst/>
+          </a:prstGeom>
+          <a:noFill/>
+        </p:spPr>
+        <p:txBody>
+          <a:bodyPr wrap="none" lIns="91440" tIns="45720" rIns="91440" bIns="45720">
+            <a:spAutoFit/>
+          </a:bodyPr>
+          <a:lstStyle/>
+          <a:p>
+            <a:pPr algn="ctr"/>
+            <a:r>
+              <a:rPr lang="en-US" sz="5400" b="1" cap="none" spc="0" dirty="0">
+                <a:ln w="22225">
+                  <a:solidFill>
+                    <a:schemeClr val="accent2"/>
+                  </a:solidFill>
+                  <a:prstDash val="solid"/>
+                </a:ln>
+                <a:solidFill>
+                  <a:schemeClr val="accent2">
+                    <a:lumMod val="40000"/>
+                    <a:lumOff val="60000"/>
+                  </a:schemeClr>
+                </a:solidFill>
+                <a:effectLst/>
+              </a:rPr>
+              <a:t>OLD – DO NOT USE</a:t>
+            </a:r>
+          </a:p>
+        </p:txBody>
+      </p:sp>
+    </p:spTree>
+    <p:extLst>
+      <p:ext uri="{BB962C8B-B14F-4D97-AF65-F5344CB8AC3E}">
+        <p14:creationId xmlns:p14="http://schemas.microsoft.com/office/powerpoint/2010/main" val="2740550696"/>
+      </p:ext>
+    </p:extLst>
+  </p:cSld>
+  <p:clrMapOvr>
+    <a:masterClrMapping/>
+  </p:clrMapOvr>
+</p:sld>
+</file>
+
+<file path=ppt/slides/slide8.xml><?xml version="1.0" encoding="utf-8"?>
+<p:sld xmlns:a="http://schemas.openxmlformats.org/drawingml/2006/main" xmlns:r="http://schemas.openxmlformats.org/officeDocument/2006/relationships" xmlns:p="http://schemas.openxmlformats.org/presentationml/2006/main">
+  <p:cSld>
+    <p:spTree>
+      <p:nvGrpSpPr>
+        <p:cNvPr id="1" name=""/>
+        <p:cNvGrpSpPr/>
+        <p:nvPr/>
+      </p:nvGrpSpPr>
+      <p:grpSpPr>
+        <a:xfrm>
+          <a:off x="0" y="0"/>
+          <a:ext cx="0" cy="0"/>
+          <a:chOff x="0" y="0"/>
+          <a:chExt cx="0" cy="0"/>
+        </a:xfrm>
+      </p:grpSpPr>
+      <p:sp>
+        <p:nvSpPr>
+          <p:cNvPr id="2" name="Title 1">
+            <a:extLst>
+              <a:ext uri="{FF2B5EF4-FFF2-40B4-BE49-F238E27FC236}">
+                <a16:creationId xmlns:a16="http://schemas.microsoft.com/office/drawing/2014/main" id="{D5BB406E-3C61-454C-A89C-7A2863DF1D3C}"/>
+              </a:ext>
+            </a:extLst>
+          </p:cNvPr>
+          <p:cNvSpPr>
+            <a:spLocks noGrp="1"/>
+          </p:cNvSpPr>
+          <p:nvPr>
+            <p:ph type="title"/>
+          </p:nvPr>
+        </p:nvSpPr>
+        <p:spPr/>
+        <p:txBody>
+          <a:bodyPr/>
+          <a:lstStyle/>
+          <a:p>
+            <a:r>
+              <a:rPr lang="en-AU" dirty="0"/>
+              <a:t>Grand tour</a:t>
+            </a:r>
+          </a:p>
+        </p:txBody>
+      </p:sp>
+      <p:sp>
+        <p:nvSpPr>
+          <p:cNvPr id="3" name="Content Placeholder 2">
+            <a:extLst>
+              <a:ext uri="{FF2B5EF4-FFF2-40B4-BE49-F238E27FC236}">
+                <a16:creationId xmlns:a16="http://schemas.microsoft.com/office/drawing/2014/main" id="{732F5234-CBCB-488F-965C-B8060D05F980}"/>
+              </a:ext>
+            </a:extLst>
+          </p:cNvPr>
+          <p:cNvSpPr>
+            <a:spLocks noGrp="1"/>
+          </p:cNvSpPr>
+          <p:nvPr>
+            <p:ph idx="1"/>
+          </p:nvPr>
+        </p:nvSpPr>
+        <p:spPr>
+          <a:xfrm>
+            <a:off x="838200" y="1825625"/>
+            <a:ext cx="4044518" cy="4351338"/>
+          </a:xfrm>
+        </p:spPr>
+        <p:txBody>
+          <a:bodyPr/>
+          <a:lstStyle/>
+          <a:p>
+            <a:r>
+              <a:rPr lang="en-AU" dirty="0"/>
+              <a:t>Identifies a few random planes</a:t>
+            </a:r>
+          </a:p>
+          <a:p>
+            <a:r>
+              <a:rPr lang="en-AU" dirty="0"/>
+              <a:t>Interpolates many planes between them</a:t>
+            </a:r>
+          </a:p>
+          <a:p>
+            <a:r>
+              <a:rPr lang="en-AU" dirty="0"/>
+              <a:t>Viewed as an animation of these planes</a:t>
+            </a:r>
+          </a:p>
+        </p:txBody>
+      </p:sp>
+      <p:pic>
+        <p:nvPicPr>
+          <p:cNvPr id="5" name="Picture 4">
+            <a:extLst>
+              <a:ext uri="{FF2B5EF4-FFF2-40B4-BE49-F238E27FC236}">
+                <a16:creationId xmlns:a16="http://schemas.microsoft.com/office/drawing/2014/main" id="{96361534-031D-401B-BB03-B7D220F2106B}"/>
+              </a:ext>
+            </a:extLst>
+          </p:cNvPr>
+          <p:cNvPicPr>
+            <a:picLocks noChangeAspect="1"/>
+          </p:cNvPicPr>
+          <p:nvPr/>
+        </p:nvPicPr>
+        <p:blipFill>
+          <a:blip r:embed="rId2"/>
+          <a:stretch>
+            <a:fillRect/>
+          </a:stretch>
+        </p:blipFill>
+        <p:spPr>
+          <a:xfrm>
+            <a:off x="4669654" y="1267782"/>
+            <a:ext cx="6684146" cy="4408692"/>
+          </a:xfrm>
+          <a:prstGeom prst="rect">
+            <a:avLst/>
+          </a:prstGeom>
+        </p:spPr>
+      </p:pic>
+      <p:sp>
+        <p:nvSpPr>
+          <p:cNvPr id="6" name="Rectangle 5">
+            <a:extLst>
+              <a:ext uri="{FF2B5EF4-FFF2-40B4-BE49-F238E27FC236}">
+                <a16:creationId xmlns:a16="http://schemas.microsoft.com/office/drawing/2014/main" id="{70A3F6AE-7651-4DC7-AC1A-00AC7E67B490}"/>
+              </a:ext>
+            </a:extLst>
+          </p:cNvPr>
+          <p:cNvSpPr/>
+          <p:nvPr/>
+        </p:nvSpPr>
+        <p:spPr>
+          <a:xfrm rot="1009859">
+            <a:off x="1454360" y="1764794"/>
+            <a:ext cx="5629298" cy="923330"/>
+          </a:xfrm>
+          <a:prstGeom prst="rect">
+            <a:avLst/>
+          </a:prstGeom>
+          <a:noFill/>
+        </p:spPr>
+        <p:txBody>
+          <a:bodyPr wrap="none" lIns="91440" tIns="45720" rIns="91440" bIns="45720">
+            <a:spAutoFit/>
+          </a:bodyPr>
+          <a:lstStyle/>
+          <a:p>
+            <a:pPr algn="ctr"/>
+            <a:r>
+              <a:rPr lang="en-US" sz="5400" b="1" cap="none" spc="0" dirty="0">
+                <a:ln w="22225">
+                  <a:solidFill>
+                    <a:schemeClr val="accent2"/>
+                  </a:solidFill>
+                  <a:prstDash val="solid"/>
+                </a:ln>
+                <a:solidFill>
+                  <a:schemeClr val="accent2">
+                    <a:lumMod val="40000"/>
+                    <a:lumOff val="60000"/>
+                  </a:schemeClr>
+                </a:solidFill>
+                <a:effectLst/>
+              </a:rPr>
+              <a:t>OLD – DO NOT USE</a:t>
+            </a:r>
+          </a:p>
+        </p:txBody>
+      </p:sp>
+    </p:spTree>
+    <p:extLst>
+      <p:ext uri="{BB962C8B-B14F-4D97-AF65-F5344CB8AC3E}">
+        <p14:creationId xmlns:p14="http://schemas.microsoft.com/office/powerpoint/2010/main" val="1154944922"/>
+      </p:ext>
+    </p:extLst>
+  </p:cSld>
+  <p:clrMapOvr>
+    <a:masterClrMapping/>
+  </p:clrMapOvr>
+</p:sld>
+</file>
+
+<file path=ppt/slides/slide9.xml><?xml version="1.0" encoding="utf-8"?>
+<p:sld xmlns:a="http://schemas.openxmlformats.org/drawingml/2006/main" xmlns:r="http://schemas.openxmlformats.org/officeDocument/2006/relationships" xmlns:p="http://schemas.openxmlformats.org/presentationml/2006/main">
+  <p:cSld>
+    <p:spTree>
+      <p:nvGrpSpPr>
+        <p:cNvPr id="1" name=""/>
+        <p:cNvGrpSpPr/>
+        <p:nvPr/>
+      </p:nvGrpSpPr>
+      <p:grpSpPr>
+        <a:xfrm>
+          <a:off x="0" y="0"/>
+          <a:ext cx="0" cy="0"/>
+          <a:chOff x="0" y="0"/>
+          <a:chExt cx="0" cy="0"/>
+        </a:xfrm>
+      </p:grpSpPr>
+      <p:sp>
+        <p:nvSpPr>
+          <p:cNvPr id="2" name="Title 1">
+            <a:extLst>
+              <a:ext uri="{FF2B5EF4-FFF2-40B4-BE49-F238E27FC236}">
                 <a16:creationId xmlns:a16="http://schemas.microsoft.com/office/drawing/2014/main" id="{112E2701-D08C-40CF-BABF-D8F9C0362757}"/>
               </a:ext>
             </a:extLst>
@@ -4528,6 +5722,56 @@
           </a:prstGeom>
         </p:spPr>
       </p:pic>
+      <p:sp>
+        <p:nvSpPr>
+          <p:cNvPr id="5" name="Rectangle 4">
+            <a:extLst>
+              <a:ext uri="{FF2B5EF4-FFF2-40B4-BE49-F238E27FC236}">
+                <a16:creationId xmlns:a16="http://schemas.microsoft.com/office/drawing/2014/main" id="{7B49C7FF-7056-4001-A458-BD6817BDB199}"/>
+              </a:ext>
+            </a:extLst>
+          </p:cNvPr>
+          <p:cNvSpPr/>
+          <p:nvPr/>
+        </p:nvSpPr>
+        <p:spPr>
+          <a:xfrm rot="1009859">
+            <a:off x="1454360" y="1764794"/>
+            <a:ext cx="5629298" cy="923330"/>
+          </a:xfrm>
+          <a:prstGeom prst="rect">
+            <a:avLst/>
+          </a:prstGeom>
+          <a:noFill/>
+        </p:spPr>
+        <p:txBody>
+          <a:bodyPr wrap="none" lIns="91440" tIns="45720" rIns="91440" bIns="45720">
+            <a:spAutoFit/>
+          </a:bodyPr>
+          <a:lstStyle/>
+          <a:p>
+            <a:pPr algn="ctr"/>
+            <a:r>
+              <a:rPr lang="en-US" sz="5400" b="1" cap="none" spc="0" dirty="0">
+                <a:ln w="22225">
+                  <a:solidFill>
+                    <a:schemeClr val="accent2"/>
+                  </a:solidFill>
+                  <a:prstDash val="solid"/>
+                </a:ln>
+                <a:solidFill>
+                  <a:schemeClr val="accent2">
+                    <a:lumMod val="40000"/>
+                    <a:lumOff val="60000"/>
+                  </a:schemeClr>
+                </a:solidFill>
+                <a:effectLst/>
+              </a:rPr>
+              <a:t>OLD – DO NOT USE</a:t>
+            </a:r>
+          </a:p>
+        </p:txBody>
+      </p:sp>
     </p:spTree>
     <p:extLst>
       <p:ext uri="{BB962C8B-B14F-4D97-AF65-F5344CB8AC3E}">

</xml_diff>